<commit_message>
slight update to slides
</commit_message>
<xml_diff>
--- a/Presentations/ccn-bbag-march-2-2017.pptx
+++ b/Presentations/ccn-bbag-march-2-2017.pptx
@@ -245,7 +245,7 @@
           <a:p>
             <a:fld id="{4F9E3613-DEF7-9F4D-BB72-F0B456B81BA8}" type="datetimeFigureOut">
               <a:rPr lang="en-US" smtClean="0"/>
-              <a:t>2/24/17</a:t>
+              <a:t>2/27/17</a:t>
             </a:fld>
             <a:endParaRPr lang="en-US"/>
           </a:p>
@@ -676,11 +676,11 @@
           <a:p>
             <a:r>
               <a:rPr lang="en-US" dirty="0" smtClean="0"/>
-              <a:t>Ok, so, again, we</a:t>
+              <a:t>Ok, so, that’s where the</a:t>
             </a:r>
             <a:r>
               <a:rPr lang="en-US" baseline="0" dirty="0" smtClean="0"/>
-              <a:t> have surprisingly little information about the processes underlying category generation. And as a result, a lot of our early experiments were really exploratory because we were just trying get a sense of what types of effects exist in a category generation experiment. And later on, we began to start building model to see what parts of category generation you can explain with existing ideas from the category learning literature.</a:t>
+              <a:t> field was as of last year. SO, lot of our early experiments were really exploratory because we were just trying get a sense of what this behavior was like. And only recently have we begun to do any systematic modeling.</a:t>
             </a:r>
           </a:p>
         </p:txBody>
@@ -1294,54 +1294,6 @@
               <a:t>So the approach we’ve taken to deal with this richness is try to characterize each participants category in terms of a set of statistics, like the range of the Beta category along each feature, or the correlation between the features.</a:t>
             </a:r>
           </a:p>
-          <a:p>
-            <a:pPr marL="0" marR="0" indent="0" algn="l" defTabSz="914400" rtl="0" eaLnBrk="1" fontAlgn="auto" latinLnBrk="0" hangingPunct="1">
-              <a:lnSpc>
-                <a:spcPct val="100000"/>
-              </a:lnSpc>
-              <a:spcBef>
-                <a:spcPts val="0"/>
-              </a:spcBef>
-              <a:spcAft>
-                <a:spcPts val="0"/>
-              </a:spcAft>
-              <a:buClrTx/>
-              <a:buSzTx/>
-              <a:buFontTx/>
-              <a:buNone/>
-              <a:tabLst/>
-              <a:defRPr/>
-            </a:pPr>
-            <a:endParaRPr lang="en-US" baseline="0" dirty="0" smtClean="0"/>
-          </a:p>
-          <a:p>
-            <a:pPr marL="0" marR="0" indent="0" algn="l" defTabSz="914400" rtl="0" eaLnBrk="1" fontAlgn="auto" latinLnBrk="0" hangingPunct="1">
-              <a:lnSpc>
-                <a:spcPct val="100000"/>
-              </a:lnSpc>
-              <a:spcBef>
-                <a:spcPts val="0"/>
-              </a:spcBef>
-              <a:spcAft>
-                <a:spcPts val="0"/>
-              </a:spcAft>
-              <a:buClrTx/>
-              <a:buSzTx/>
-              <a:buFontTx/>
-              <a:buNone/>
-              <a:tabLst/>
-              <a:defRPr/>
-            </a:pPr>
-            <a:r>
-              <a:rPr lang="en-US" baseline="0" dirty="0" smtClean="0"/>
-              <a:t>So for example </a:t>
-            </a:r>
-            <a:r>
-              <a:rPr lang="mr-IN" baseline="0" dirty="0" smtClean="0"/>
-              <a:t>…</a:t>
-            </a:r>
-            <a:endParaRPr lang="en-US" baseline="0" dirty="0" smtClean="0"/>
-          </a:p>
         </p:txBody>
       </p:sp>
       <p:sp>
@@ -1560,7 +1512,15 @@
             </a:pPr>
             <a:r>
               <a:rPr lang="en-US" dirty="0" smtClean="0"/>
-              <a:t>Just as the</a:t>
+              <a:t>So with respect</a:t>
+            </a:r>
+            <a:r>
+              <a:rPr lang="en-US" baseline="0" dirty="0" smtClean="0"/>
+              <a:t> the X axis, or horizontal range, j</a:t>
+            </a:r>
+            <a:r>
+              <a:rPr lang="en-US" dirty="0" smtClean="0"/>
+              <a:t>ust as the</a:t>
             </a:r>
             <a:r>
               <a:rPr lang="en-US" baseline="0" dirty="0" smtClean="0"/>
@@ -1568,7 +1528,7 @@
             </a:r>
             <a:r>
               <a:rPr lang="en-US" dirty="0" smtClean="0"/>
-              <a:t>he XOR condition categories had more X axis, or horizontal range than the other two conditions.</a:t>
+              <a:t>he XOR condition had the most X axis range, followed by the Row condition, followed by the cluster condition</a:t>
             </a:r>
           </a:p>
         </p:txBody>
@@ -2033,19 +1993,11 @@
             </a:pPr>
             <a:r>
               <a:rPr lang="en-US" dirty="0" smtClean="0"/>
-              <a:t>Okay, so we have some good evidence that</a:t>
+              <a:t>So I</a:t>
             </a:r>
             <a:r>
               <a:rPr lang="en-US" baseline="0" dirty="0" smtClean="0"/>
-              <a:t> our methods are consistent with what </a:t>
-            </a:r>
-            <a:r>
-              <a:rPr lang="en-US" baseline="0" dirty="0" err="1" smtClean="0"/>
-              <a:t>Jern</a:t>
-            </a:r>
-            <a:r>
-              <a:rPr lang="en-US" baseline="0" dirty="0" smtClean="0"/>
-              <a:t> and Kemp did, and we replicated the core observation that we’ve seen in all the existing studies.</a:t>
+              <a:t> think that’s some pretty good evidence that people do emulate the distributional properties of learned categories in what they generate.</a:t>
             </a:r>
           </a:p>
           <a:p>
@@ -3800,11 +3752,7 @@
             </a:r>
             <a:r>
               <a:rPr lang="en-US" baseline="0" dirty="0" smtClean="0"/>
-              <a:t> sort of thing is tough to account for if your only explanatory mechanism based on knowledge of how other categories are distributed. </a:t>
-            </a:r>
-            <a:r>
-              <a:rPr lang="en-US" baseline="0" dirty="0" smtClean="0"/>
-              <a:t>Like, how could you explain such huge variability when everybody in the study has the same prior knowledge?</a:t>
+              <a:t> sort of thing is tough to account for if your only explanatory mechanism based on knowledge of how other categories are distributed. Like, how could you explain such huge variability when everybody in the study has the same prior knowledge?</a:t>
             </a:r>
           </a:p>
           <a:p>
@@ -3851,11 +3799,7 @@
             </a:r>
             <a:r>
               <a:rPr lang="en-US" dirty="0" smtClean="0"/>
-              <a:t> </a:t>
-            </a:r>
-            <a:r>
-              <a:rPr lang="en-US" dirty="0" smtClean="0"/>
-              <a:t>I think you can explain a lot about each participant’s profile if</a:t>
+              <a:t> I think you can explain a lot about each participant’s profile if</a:t>
             </a:r>
             <a:r>
               <a:rPr lang="en-US" baseline="0" dirty="0" smtClean="0"/>
@@ -6617,7 +6561,7 @@
           <a:p>
             <a:fld id="{3FB76B9B-0F6A-7D4E-99AB-769CFDC92DBC}" type="datetimeFigureOut">
               <a:rPr lang="en-US" smtClean="0"/>
-              <a:t>2/24/17</a:t>
+              <a:t>2/27/17</a:t>
             </a:fld>
             <a:endParaRPr lang="en-US"/>
           </a:p>
@@ -6787,7 +6731,7 @@
           <a:p>
             <a:fld id="{3FB76B9B-0F6A-7D4E-99AB-769CFDC92DBC}" type="datetimeFigureOut">
               <a:rPr lang="en-US" smtClean="0"/>
-              <a:t>2/24/17</a:t>
+              <a:t>2/27/17</a:t>
             </a:fld>
             <a:endParaRPr lang="en-US"/>
           </a:p>
@@ -6967,7 +6911,7 @@
           <a:p>
             <a:fld id="{3FB76B9B-0F6A-7D4E-99AB-769CFDC92DBC}" type="datetimeFigureOut">
               <a:rPr lang="en-US" smtClean="0"/>
-              <a:t>2/24/17</a:t>
+              <a:t>2/27/17</a:t>
             </a:fld>
             <a:endParaRPr lang="en-US"/>
           </a:p>
@@ -7137,7 +7081,7 @@
           <a:p>
             <a:fld id="{3FB76B9B-0F6A-7D4E-99AB-769CFDC92DBC}" type="datetimeFigureOut">
               <a:rPr lang="en-US" smtClean="0"/>
-              <a:t>2/24/17</a:t>
+              <a:t>2/27/17</a:t>
             </a:fld>
             <a:endParaRPr lang="en-US"/>
           </a:p>
@@ -7381,7 +7325,7 @@
           <a:p>
             <a:fld id="{3FB76B9B-0F6A-7D4E-99AB-769CFDC92DBC}" type="datetimeFigureOut">
               <a:rPr lang="en-US" smtClean="0"/>
-              <a:t>2/24/17</a:t>
+              <a:t>2/27/17</a:t>
             </a:fld>
             <a:endParaRPr lang="en-US"/>
           </a:p>
@@ -7613,7 +7557,7 @@
           <a:p>
             <a:fld id="{3FB76B9B-0F6A-7D4E-99AB-769CFDC92DBC}" type="datetimeFigureOut">
               <a:rPr lang="en-US" smtClean="0"/>
-              <a:t>2/24/17</a:t>
+              <a:t>2/27/17</a:t>
             </a:fld>
             <a:endParaRPr lang="en-US"/>
           </a:p>
@@ -7980,7 +7924,7 @@
           <a:p>
             <a:fld id="{3FB76B9B-0F6A-7D4E-99AB-769CFDC92DBC}" type="datetimeFigureOut">
               <a:rPr lang="en-US" smtClean="0"/>
-              <a:t>2/24/17</a:t>
+              <a:t>2/27/17</a:t>
             </a:fld>
             <a:endParaRPr lang="en-US"/>
           </a:p>
@@ -8098,7 +8042,7 @@
           <a:p>
             <a:fld id="{3FB76B9B-0F6A-7D4E-99AB-769CFDC92DBC}" type="datetimeFigureOut">
               <a:rPr lang="en-US" smtClean="0"/>
-              <a:t>2/24/17</a:t>
+              <a:t>2/27/17</a:t>
             </a:fld>
             <a:endParaRPr lang="en-US"/>
           </a:p>
@@ -8193,7 +8137,7 @@
           <a:p>
             <a:fld id="{3FB76B9B-0F6A-7D4E-99AB-769CFDC92DBC}" type="datetimeFigureOut">
               <a:rPr lang="en-US" smtClean="0"/>
-              <a:t>2/24/17</a:t>
+              <a:t>2/27/17</a:t>
             </a:fld>
             <a:endParaRPr lang="en-US"/>
           </a:p>
@@ -8470,7 +8414,7 @@
           <a:p>
             <a:fld id="{3FB76B9B-0F6A-7D4E-99AB-769CFDC92DBC}" type="datetimeFigureOut">
               <a:rPr lang="en-US" smtClean="0"/>
-              <a:t>2/24/17</a:t>
+              <a:t>2/27/17</a:t>
             </a:fld>
             <a:endParaRPr lang="en-US"/>
           </a:p>
@@ -8727,7 +8671,7 @@
           <a:p>
             <a:fld id="{3FB76B9B-0F6A-7D4E-99AB-769CFDC92DBC}" type="datetimeFigureOut">
               <a:rPr lang="en-US" smtClean="0"/>
-              <a:t>2/24/17</a:t>
+              <a:t>2/27/17</a:t>
             </a:fld>
             <a:endParaRPr lang="en-US"/>
           </a:p>
@@ -8940,7 +8884,7 @@
           <a:p>
             <a:fld id="{3FB76B9B-0F6A-7D4E-99AB-769CFDC92DBC}" type="datetimeFigureOut">
               <a:rPr lang="en-US" smtClean="0"/>
-              <a:t>2/24/17</a:t>
+              <a:t>2/27/17</a:t>
             </a:fld>
             <a:endParaRPr lang="en-US"/>
           </a:p>
@@ -9355,6 +9299,13 @@
   <p:clrMapOvr>
     <a:masterClrMapping/>
   </p:clrMapOvr>
+  <p:timing>
+    <p:tnLst>
+      <p:par>
+        <p:cTn id="1" dur="indefinite" restart="never" nodeType="tmRoot"/>
+      </p:par>
+    </p:tnLst>
+  </p:timing>
 </p:sld>
 </file>
 
@@ -14538,20 +14489,6 @@
             </a:r>
           </a:p>
           <a:p>
-            <a:pPr marL="290513" indent="-173038">
-              <a:buFont typeface="Arial" charset="0"/>
-              <a:buChar char="•"/>
-            </a:pPr>
-            <a:r>
-              <a:rPr lang="en-US" sz="2000" dirty="0" smtClean="0">
-                <a:solidFill>
-                  <a:schemeClr val="tx1"/>
-                </a:solidFill>
-              </a:rPr>
-              <a:t>Within- &amp; Between-class distance</a:t>
-            </a:r>
-          </a:p>
-          <a:p>
             <a:pPr marL="63500"/>
             <a:endParaRPr lang="en-US" sz="2000" dirty="0">
               <a:solidFill>
@@ -14638,13 +14575,13 @@
       </p:pic>
       <p:sp>
         <p:nvSpPr>
-          <p:cNvPr id="7" name="TextBox 6"/>
+          <p:cNvPr id="4" name="TextBox 3"/>
           <p:cNvSpPr txBox="1"/>
           <p:nvPr/>
         </p:nvSpPr>
         <p:spPr>
           <a:xfrm>
-            <a:off x="653143" y="640632"/>
+            <a:off x="323534" y="147024"/>
             <a:ext cx="5166094" cy="584775"/>
           </a:xfrm>
           <a:prstGeom prst="rect">
@@ -14670,6 +14607,201 @@
           </a:p>
         </p:txBody>
       </p:sp>
+      <p:grpSp>
+        <p:nvGrpSpPr>
+          <p:cNvPr id="5" name="Group 4"/>
+          <p:cNvGrpSpPr/>
+          <p:nvPr/>
+        </p:nvGrpSpPr>
+        <p:grpSpPr>
+          <a:xfrm>
+            <a:off x="2142846" y="844790"/>
+            <a:ext cx="4861478" cy="1703170"/>
+            <a:chOff x="1212850" y="4000320"/>
+            <a:chExt cx="7616825" cy="2668479"/>
+          </a:xfrm>
+        </p:grpSpPr>
+        <p:pic>
+          <p:nvPicPr>
+            <p:cNvPr id="6" name="Picture 5"/>
+            <p:cNvPicPr>
+              <a:picLocks noChangeAspect="1"/>
+            </p:cNvPicPr>
+            <p:nvPr/>
+          </p:nvPicPr>
+          <p:blipFill>
+            <a:blip r:embed="rId4">
+              <a:extLst>
+                <a:ext uri="{28A0092B-C50C-407E-A947-70E740481C1C}">
+                  <a14:useLocalDpi xmlns:a14="http://schemas.microsoft.com/office/drawing/2010/main" val="0"/>
+                </a:ext>
+              </a:extLst>
+            </a:blip>
+            <a:stretch>
+              <a:fillRect/>
+            </a:stretch>
+          </p:blipFill>
+          <p:spPr>
+            <a:xfrm>
+              <a:off x="3751792" y="4000320"/>
+              <a:ext cx="2538942" cy="2668479"/>
+            </a:xfrm>
+            <a:prstGeom prst="rect">
+              <a:avLst/>
+            </a:prstGeom>
+          </p:spPr>
+        </p:pic>
+        <p:pic>
+          <p:nvPicPr>
+            <p:cNvPr id="9" name="Picture 8"/>
+            <p:cNvPicPr>
+              <a:picLocks noChangeAspect="1"/>
+            </p:cNvPicPr>
+            <p:nvPr/>
+          </p:nvPicPr>
+          <p:blipFill>
+            <a:blip r:embed="rId5">
+              <a:extLst>
+                <a:ext uri="{28A0092B-C50C-407E-A947-70E740481C1C}">
+                  <a14:useLocalDpi xmlns:a14="http://schemas.microsoft.com/office/drawing/2010/main" val="0"/>
+                </a:ext>
+              </a:extLst>
+            </a:blip>
+            <a:stretch>
+              <a:fillRect/>
+            </a:stretch>
+          </p:blipFill>
+          <p:spPr>
+            <a:xfrm>
+              <a:off x="6290733" y="4000320"/>
+              <a:ext cx="2538942" cy="2668479"/>
+            </a:xfrm>
+            <a:prstGeom prst="rect">
+              <a:avLst/>
+            </a:prstGeom>
+          </p:spPr>
+        </p:pic>
+        <p:pic>
+          <p:nvPicPr>
+            <p:cNvPr id="10" name="Picture 9"/>
+            <p:cNvPicPr>
+              <a:picLocks noChangeAspect="1"/>
+            </p:cNvPicPr>
+            <p:nvPr/>
+          </p:nvPicPr>
+          <p:blipFill>
+            <a:blip r:embed="rId6">
+              <a:extLst>
+                <a:ext uri="{28A0092B-C50C-407E-A947-70E740481C1C}">
+                  <a14:useLocalDpi xmlns:a14="http://schemas.microsoft.com/office/drawing/2010/main" val="0"/>
+                </a:ext>
+              </a:extLst>
+            </a:blip>
+            <a:stretch>
+              <a:fillRect/>
+            </a:stretch>
+          </p:blipFill>
+          <p:spPr>
+            <a:xfrm>
+              <a:off x="1212850" y="4000320"/>
+              <a:ext cx="2538942" cy="2668479"/>
+            </a:xfrm>
+            <a:prstGeom prst="rect">
+              <a:avLst/>
+            </a:prstGeom>
+          </p:spPr>
+        </p:pic>
+        <p:sp>
+          <p:nvSpPr>
+            <p:cNvPr id="11" name="TextBox 10"/>
+            <p:cNvSpPr txBox="1"/>
+            <p:nvPr/>
+          </p:nvSpPr>
+          <p:spPr>
+            <a:xfrm>
+              <a:off x="1251239" y="4023279"/>
+              <a:ext cx="2500554" cy="497210"/>
+            </a:xfrm>
+            <a:prstGeom prst="rect">
+              <a:avLst/>
+            </a:prstGeom>
+            <a:noFill/>
+          </p:spPr>
+          <p:txBody>
+            <a:bodyPr wrap="square" rtlCol="0">
+              <a:spAutoFit/>
+            </a:bodyPr>
+            <a:lstStyle/>
+            <a:p>
+              <a:r>
+                <a:rPr lang="en-US" sz="2000" smtClean="0"/>
+                <a:t>XOR</a:t>
+              </a:r>
+              <a:endParaRPr lang="en-US" sz="2000"/>
+            </a:p>
+          </p:txBody>
+        </p:sp>
+        <p:sp>
+          <p:nvSpPr>
+            <p:cNvPr id="12" name="TextBox 11"/>
+            <p:cNvSpPr txBox="1"/>
+            <p:nvPr/>
+          </p:nvSpPr>
+          <p:spPr>
+            <a:xfrm>
+              <a:off x="3751792" y="4058494"/>
+              <a:ext cx="2500554" cy="497210"/>
+            </a:xfrm>
+            <a:prstGeom prst="rect">
+              <a:avLst/>
+            </a:prstGeom>
+            <a:noFill/>
+          </p:spPr>
+          <p:txBody>
+            <a:bodyPr wrap="square" rtlCol="0">
+              <a:spAutoFit/>
+            </a:bodyPr>
+            <a:lstStyle/>
+            <a:p>
+              <a:r>
+                <a:rPr lang="en-US" sz="2000" smtClean="0"/>
+                <a:t>Cluster</a:t>
+              </a:r>
+              <a:endParaRPr lang="en-US" sz="2000"/>
+            </a:p>
+          </p:txBody>
+        </p:sp>
+        <p:sp>
+          <p:nvSpPr>
+            <p:cNvPr id="13" name="TextBox 12"/>
+            <p:cNvSpPr txBox="1"/>
+            <p:nvPr/>
+          </p:nvSpPr>
+          <p:spPr>
+            <a:xfrm>
+              <a:off x="6290733" y="4023279"/>
+              <a:ext cx="2538942" cy="497210"/>
+            </a:xfrm>
+            <a:prstGeom prst="rect">
+              <a:avLst/>
+            </a:prstGeom>
+            <a:noFill/>
+          </p:spPr>
+          <p:txBody>
+            <a:bodyPr wrap="square" rtlCol="0">
+              <a:spAutoFit/>
+            </a:bodyPr>
+            <a:lstStyle/>
+            <a:p>
+              <a:r>
+                <a:rPr lang="en-US" sz="2000" dirty="0" smtClean="0"/>
+                <a:t>Row</a:t>
+              </a:r>
+              <a:endParaRPr lang="en-US" sz="2000" dirty="0"/>
+            </a:p>
+          </p:txBody>
+        </p:sp>
+      </p:grpSp>
     </p:spTree>
     <p:extLst>
       <p:ext uri="{BB962C8B-B14F-4D97-AF65-F5344CB8AC3E}">
@@ -14868,7 +15000,7 @@
         </p:nvSpPr>
         <p:spPr>
           <a:xfrm>
-            <a:off x="653143" y="640632"/>
+            <a:off x="323534" y="147024"/>
             <a:ext cx="5166094" cy="584775"/>
           </a:xfrm>
           <a:prstGeom prst="rect">
@@ -14894,6 +15026,201 @@
           </a:p>
         </p:txBody>
       </p:sp>
+      <p:grpSp>
+        <p:nvGrpSpPr>
+          <p:cNvPr id="5" name="Group 4"/>
+          <p:cNvGrpSpPr/>
+          <p:nvPr/>
+        </p:nvGrpSpPr>
+        <p:grpSpPr>
+          <a:xfrm>
+            <a:off x="2142846" y="844790"/>
+            <a:ext cx="4861478" cy="1703170"/>
+            <a:chOff x="1212850" y="4000320"/>
+            <a:chExt cx="7616825" cy="2668479"/>
+          </a:xfrm>
+        </p:grpSpPr>
+        <p:pic>
+          <p:nvPicPr>
+            <p:cNvPr id="7" name="Picture 6"/>
+            <p:cNvPicPr>
+              <a:picLocks noChangeAspect="1"/>
+            </p:cNvPicPr>
+            <p:nvPr/>
+          </p:nvPicPr>
+          <p:blipFill>
+            <a:blip r:embed="rId4">
+              <a:extLst>
+                <a:ext uri="{28A0092B-C50C-407E-A947-70E740481C1C}">
+                  <a14:useLocalDpi xmlns:a14="http://schemas.microsoft.com/office/drawing/2010/main" val="0"/>
+                </a:ext>
+              </a:extLst>
+            </a:blip>
+            <a:stretch>
+              <a:fillRect/>
+            </a:stretch>
+          </p:blipFill>
+          <p:spPr>
+            <a:xfrm>
+              <a:off x="3751792" y="4000320"/>
+              <a:ext cx="2538942" cy="2668479"/>
+            </a:xfrm>
+            <a:prstGeom prst="rect">
+              <a:avLst/>
+            </a:prstGeom>
+          </p:spPr>
+        </p:pic>
+        <p:pic>
+          <p:nvPicPr>
+            <p:cNvPr id="10" name="Picture 9"/>
+            <p:cNvPicPr>
+              <a:picLocks noChangeAspect="1"/>
+            </p:cNvPicPr>
+            <p:nvPr/>
+          </p:nvPicPr>
+          <p:blipFill>
+            <a:blip r:embed="rId5">
+              <a:extLst>
+                <a:ext uri="{28A0092B-C50C-407E-A947-70E740481C1C}">
+                  <a14:useLocalDpi xmlns:a14="http://schemas.microsoft.com/office/drawing/2010/main" val="0"/>
+                </a:ext>
+              </a:extLst>
+            </a:blip>
+            <a:stretch>
+              <a:fillRect/>
+            </a:stretch>
+          </p:blipFill>
+          <p:spPr>
+            <a:xfrm>
+              <a:off x="6290733" y="4000320"/>
+              <a:ext cx="2538942" cy="2668479"/>
+            </a:xfrm>
+            <a:prstGeom prst="rect">
+              <a:avLst/>
+            </a:prstGeom>
+          </p:spPr>
+        </p:pic>
+        <p:pic>
+          <p:nvPicPr>
+            <p:cNvPr id="11" name="Picture 10"/>
+            <p:cNvPicPr>
+              <a:picLocks noChangeAspect="1"/>
+            </p:cNvPicPr>
+            <p:nvPr/>
+          </p:nvPicPr>
+          <p:blipFill>
+            <a:blip r:embed="rId6">
+              <a:extLst>
+                <a:ext uri="{28A0092B-C50C-407E-A947-70E740481C1C}">
+                  <a14:useLocalDpi xmlns:a14="http://schemas.microsoft.com/office/drawing/2010/main" val="0"/>
+                </a:ext>
+              </a:extLst>
+            </a:blip>
+            <a:stretch>
+              <a:fillRect/>
+            </a:stretch>
+          </p:blipFill>
+          <p:spPr>
+            <a:xfrm>
+              <a:off x="1212850" y="4000320"/>
+              <a:ext cx="2538942" cy="2668479"/>
+            </a:xfrm>
+            <a:prstGeom prst="rect">
+              <a:avLst/>
+            </a:prstGeom>
+          </p:spPr>
+        </p:pic>
+        <p:sp>
+          <p:nvSpPr>
+            <p:cNvPr id="12" name="TextBox 11"/>
+            <p:cNvSpPr txBox="1"/>
+            <p:nvPr/>
+          </p:nvSpPr>
+          <p:spPr>
+            <a:xfrm>
+              <a:off x="1251239" y="4023279"/>
+              <a:ext cx="2500554" cy="497210"/>
+            </a:xfrm>
+            <a:prstGeom prst="rect">
+              <a:avLst/>
+            </a:prstGeom>
+            <a:noFill/>
+          </p:spPr>
+          <p:txBody>
+            <a:bodyPr wrap="square" rtlCol="0">
+              <a:spAutoFit/>
+            </a:bodyPr>
+            <a:lstStyle/>
+            <a:p>
+              <a:r>
+                <a:rPr lang="en-US" sz="2000" smtClean="0"/>
+                <a:t>XOR</a:t>
+              </a:r>
+              <a:endParaRPr lang="en-US" sz="2000"/>
+            </a:p>
+          </p:txBody>
+        </p:sp>
+        <p:sp>
+          <p:nvSpPr>
+            <p:cNvPr id="13" name="TextBox 12"/>
+            <p:cNvSpPr txBox="1"/>
+            <p:nvPr/>
+          </p:nvSpPr>
+          <p:spPr>
+            <a:xfrm>
+              <a:off x="3751792" y="4058494"/>
+              <a:ext cx="2500554" cy="497210"/>
+            </a:xfrm>
+            <a:prstGeom prst="rect">
+              <a:avLst/>
+            </a:prstGeom>
+            <a:noFill/>
+          </p:spPr>
+          <p:txBody>
+            <a:bodyPr wrap="square" rtlCol="0">
+              <a:spAutoFit/>
+            </a:bodyPr>
+            <a:lstStyle/>
+            <a:p>
+              <a:r>
+                <a:rPr lang="en-US" sz="2000" smtClean="0"/>
+                <a:t>Cluster</a:t>
+              </a:r>
+              <a:endParaRPr lang="en-US" sz="2000"/>
+            </a:p>
+          </p:txBody>
+        </p:sp>
+        <p:sp>
+          <p:nvSpPr>
+            <p:cNvPr id="14" name="TextBox 13"/>
+            <p:cNvSpPr txBox="1"/>
+            <p:nvPr/>
+          </p:nvSpPr>
+          <p:spPr>
+            <a:xfrm>
+              <a:off x="6290733" y="4023279"/>
+              <a:ext cx="2538942" cy="497210"/>
+            </a:xfrm>
+            <a:prstGeom prst="rect">
+              <a:avLst/>
+            </a:prstGeom>
+            <a:noFill/>
+          </p:spPr>
+          <p:txBody>
+            <a:bodyPr wrap="square" rtlCol="0">
+              <a:spAutoFit/>
+            </a:bodyPr>
+            <a:lstStyle/>
+            <a:p>
+              <a:r>
+                <a:rPr lang="en-US" sz="2000" dirty="0" smtClean="0"/>
+                <a:t>Row</a:t>
+              </a:r>
+              <a:endParaRPr lang="en-US" sz="2000" dirty="0"/>
+            </a:p>
+          </p:txBody>
+        </p:sp>
+      </p:grpSp>
     </p:spTree>
     <p:extLst>
       <p:ext uri="{BB962C8B-B14F-4D97-AF65-F5344CB8AC3E}">
@@ -15386,13 +15713,13 @@
       </p:sp>
       <p:sp>
         <p:nvSpPr>
-          <p:cNvPr id="9" name="TextBox 8"/>
+          <p:cNvPr id="7" name="TextBox 6"/>
           <p:cNvSpPr txBox="1"/>
           <p:nvPr/>
         </p:nvSpPr>
         <p:spPr>
           <a:xfrm>
-            <a:off x="653143" y="640632"/>
+            <a:off x="323534" y="147024"/>
             <a:ext cx="5166094" cy="584775"/>
           </a:xfrm>
           <a:prstGeom prst="rect">
@@ -15418,6 +15745,201 @@
           </a:p>
         </p:txBody>
       </p:sp>
+      <p:grpSp>
+        <p:nvGrpSpPr>
+          <p:cNvPr id="10" name="Group 9"/>
+          <p:cNvGrpSpPr/>
+          <p:nvPr/>
+        </p:nvGrpSpPr>
+        <p:grpSpPr>
+          <a:xfrm>
+            <a:off x="2142846" y="844790"/>
+            <a:ext cx="4861478" cy="1703170"/>
+            <a:chOff x="1212850" y="4000320"/>
+            <a:chExt cx="7616825" cy="2668479"/>
+          </a:xfrm>
+        </p:grpSpPr>
+        <p:pic>
+          <p:nvPicPr>
+            <p:cNvPr id="11" name="Picture 10"/>
+            <p:cNvPicPr>
+              <a:picLocks noChangeAspect="1"/>
+            </p:cNvPicPr>
+            <p:nvPr/>
+          </p:nvPicPr>
+          <p:blipFill>
+            <a:blip r:embed="rId4">
+              <a:extLst>
+                <a:ext uri="{28A0092B-C50C-407E-A947-70E740481C1C}">
+                  <a14:useLocalDpi xmlns:a14="http://schemas.microsoft.com/office/drawing/2010/main" val="0"/>
+                </a:ext>
+              </a:extLst>
+            </a:blip>
+            <a:stretch>
+              <a:fillRect/>
+            </a:stretch>
+          </p:blipFill>
+          <p:spPr>
+            <a:xfrm>
+              <a:off x="3751792" y="4000320"/>
+              <a:ext cx="2538942" cy="2668479"/>
+            </a:xfrm>
+            <a:prstGeom prst="rect">
+              <a:avLst/>
+            </a:prstGeom>
+          </p:spPr>
+        </p:pic>
+        <p:pic>
+          <p:nvPicPr>
+            <p:cNvPr id="12" name="Picture 11"/>
+            <p:cNvPicPr>
+              <a:picLocks noChangeAspect="1"/>
+            </p:cNvPicPr>
+            <p:nvPr/>
+          </p:nvPicPr>
+          <p:blipFill>
+            <a:blip r:embed="rId5">
+              <a:extLst>
+                <a:ext uri="{28A0092B-C50C-407E-A947-70E740481C1C}">
+                  <a14:useLocalDpi xmlns:a14="http://schemas.microsoft.com/office/drawing/2010/main" val="0"/>
+                </a:ext>
+              </a:extLst>
+            </a:blip>
+            <a:stretch>
+              <a:fillRect/>
+            </a:stretch>
+          </p:blipFill>
+          <p:spPr>
+            <a:xfrm>
+              <a:off x="6290733" y="4000320"/>
+              <a:ext cx="2538942" cy="2668479"/>
+            </a:xfrm>
+            <a:prstGeom prst="rect">
+              <a:avLst/>
+            </a:prstGeom>
+          </p:spPr>
+        </p:pic>
+        <p:pic>
+          <p:nvPicPr>
+            <p:cNvPr id="13" name="Picture 12"/>
+            <p:cNvPicPr>
+              <a:picLocks noChangeAspect="1"/>
+            </p:cNvPicPr>
+            <p:nvPr/>
+          </p:nvPicPr>
+          <p:blipFill>
+            <a:blip r:embed="rId6">
+              <a:extLst>
+                <a:ext uri="{28A0092B-C50C-407E-A947-70E740481C1C}">
+                  <a14:useLocalDpi xmlns:a14="http://schemas.microsoft.com/office/drawing/2010/main" val="0"/>
+                </a:ext>
+              </a:extLst>
+            </a:blip>
+            <a:stretch>
+              <a:fillRect/>
+            </a:stretch>
+          </p:blipFill>
+          <p:spPr>
+            <a:xfrm>
+              <a:off x="1212850" y="4000320"/>
+              <a:ext cx="2538942" cy="2668479"/>
+            </a:xfrm>
+            <a:prstGeom prst="rect">
+              <a:avLst/>
+            </a:prstGeom>
+          </p:spPr>
+        </p:pic>
+        <p:sp>
+          <p:nvSpPr>
+            <p:cNvPr id="14" name="TextBox 13"/>
+            <p:cNvSpPr txBox="1"/>
+            <p:nvPr/>
+          </p:nvSpPr>
+          <p:spPr>
+            <a:xfrm>
+              <a:off x="1251239" y="4023279"/>
+              <a:ext cx="2500554" cy="497210"/>
+            </a:xfrm>
+            <a:prstGeom prst="rect">
+              <a:avLst/>
+            </a:prstGeom>
+            <a:noFill/>
+          </p:spPr>
+          <p:txBody>
+            <a:bodyPr wrap="square" rtlCol="0">
+              <a:spAutoFit/>
+            </a:bodyPr>
+            <a:lstStyle/>
+            <a:p>
+              <a:r>
+                <a:rPr lang="en-US" sz="2000" smtClean="0"/>
+                <a:t>XOR</a:t>
+              </a:r>
+              <a:endParaRPr lang="en-US" sz="2000"/>
+            </a:p>
+          </p:txBody>
+        </p:sp>
+        <p:sp>
+          <p:nvSpPr>
+            <p:cNvPr id="15" name="TextBox 14"/>
+            <p:cNvSpPr txBox="1"/>
+            <p:nvPr/>
+          </p:nvSpPr>
+          <p:spPr>
+            <a:xfrm>
+              <a:off x="3751792" y="4058494"/>
+              <a:ext cx="2500554" cy="497210"/>
+            </a:xfrm>
+            <a:prstGeom prst="rect">
+              <a:avLst/>
+            </a:prstGeom>
+            <a:noFill/>
+          </p:spPr>
+          <p:txBody>
+            <a:bodyPr wrap="square" rtlCol="0">
+              <a:spAutoFit/>
+            </a:bodyPr>
+            <a:lstStyle/>
+            <a:p>
+              <a:r>
+                <a:rPr lang="en-US" sz="2000" smtClean="0"/>
+                <a:t>Cluster</a:t>
+              </a:r>
+              <a:endParaRPr lang="en-US" sz="2000"/>
+            </a:p>
+          </p:txBody>
+        </p:sp>
+        <p:sp>
+          <p:nvSpPr>
+            <p:cNvPr id="16" name="TextBox 15"/>
+            <p:cNvSpPr txBox="1"/>
+            <p:nvPr/>
+          </p:nvSpPr>
+          <p:spPr>
+            <a:xfrm>
+              <a:off x="6290733" y="4023279"/>
+              <a:ext cx="2538942" cy="497210"/>
+            </a:xfrm>
+            <a:prstGeom prst="rect">
+              <a:avLst/>
+            </a:prstGeom>
+            <a:noFill/>
+          </p:spPr>
+          <p:txBody>
+            <a:bodyPr wrap="square" rtlCol="0">
+              <a:spAutoFit/>
+            </a:bodyPr>
+            <a:lstStyle/>
+            <a:p>
+              <a:r>
+                <a:rPr lang="en-US" sz="2000" dirty="0" smtClean="0"/>
+                <a:t>Row</a:t>
+              </a:r>
+              <a:endParaRPr lang="en-US" sz="2000" dirty="0"/>
+            </a:p>
+          </p:txBody>
+        </p:sp>
+      </p:grpSp>
     </p:spTree>
     <p:extLst>
       <p:ext uri="{BB962C8B-B14F-4D97-AF65-F5344CB8AC3E}">
@@ -15779,13 +16301,13 @@
       </p:grpSp>
       <p:sp>
         <p:nvSpPr>
-          <p:cNvPr id="26" name="TextBox 25"/>
+          <p:cNvPr id="9" name="TextBox 8"/>
           <p:cNvSpPr txBox="1"/>
           <p:nvPr/>
         </p:nvSpPr>
         <p:spPr>
           <a:xfrm>
-            <a:off x="653143" y="640632"/>
+            <a:off x="323534" y="147024"/>
             <a:ext cx="5166094" cy="584775"/>
           </a:xfrm>
           <a:prstGeom prst="rect">
@@ -15811,6 +16333,201 @@
           </a:p>
         </p:txBody>
       </p:sp>
+      <p:grpSp>
+        <p:nvGrpSpPr>
+          <p:cNvPr id="10" name="Group 9"/>
+          <p:cNvGrpSpPr/>
+          <p:nvPr/>
+        </p:nvGrpSpPr>
+        <p:grpSpPr>
+          <a:xfrm>
+            <a:off x="2142846" y="844790"/>
+            <a:ext cx="4861478" cy="1703170"/>
+            <a:chOff x="1212850" y="4000320"/>
+            <a:chExt cx="7616825" cy="2668479"/>
+          </a:xfrm>
+        </p:grpSpPr>
+        <p:pic>
+          <p:nvPicPr>
+            <p:cNvPr id="12" name="Picture 11"/>
+            <p:cNvPicPr>
+              <a:picLocks noChangeAspect="1"/>
+            </p:cNvPicPr>
+            <p:nvPr/>
+          </p:nvPicPr>
+          <p:blipFill>
+            <a:blip r:embed="rId5">
+              <a:extLst>
+                <a:ext uri="{28A0092B-C50C-407E-A947-70E740481C1C}">
+                  <a14:useLocalDpi xmlns:a14="http://schemas.microsoft.com/office/drawing/2010/main" val="0"/>
+                </a:ext>
+              </a:extLst>
+            </a:blip>
+            <a:stretch>
+              <a:fillRect/>
+            </a:stretch>
+          </p:blipFill>
+          <p:spPr>
+            <a:xfrm>
+              <a:off x="3751792" y="4000320"/>
+              <a:ext cx="2538942" cy="2668479"/>
+            </a:xfrm>
+            <a:prstGeom prst="rect">
+              <a:avLst/>
+            </a:prstGeom>
+          </p:spPr>
+        </p:pic>
+        <p:pic>
+          <p:nvPicPr>
+            <p:cNvPr id="13" name="Picture 12"/>
+            <p:cNvPicPr>
+              <a:picLocks noChangeAspect="1"/>
+            </p:cNvPicPr>
+            <p:nvPr/>
+          </p:nvPicPr>
+          <p:blipFill>
+            <a:blip r:embed="rId6">
+              <a:extLst>
+                <a:ext uri="{28A0092B-C50C-407E-A947-70E740481C1C}">
+                  <a14:useLocalDpi xmlns:a14="http://schemas.microsoft.com/office/drawing/2010/main" val="0"/>
+                </a:ext>
+              </a:extLst>
+            </a:blip>
+            <a:stretch>
+              <a:fillRect/>
+            </a:stretch>
+          </p:blipFill>
+          <p:spPr>
+            <a:xfrm>
+              <a:off x="6290733" y="4000320"/>
+              <a:ext cx="2538942" cy="2668479"/>
+            </a:xfrm>
+            <a:prstGeom prst="rect">
+              <a:avLst/>
+            </a:prstGeom>
+          </p:spPr>
+        </p:pic>
+        <p:pic>
+          <p:nvPicPr>
+            <p:cNvPr id="14" name="Picture 13"/>
+            <p:cNvPicPr>
+              <a:picLocks noChangeAspect="1"/>
+            </p:cNvPicPr>
+            <p:nvPr/>
+          </p:nvPicPr>
+          <p:blipFill>
+            <a:blip r:embed="rId4">
+              <a:extLst>
+                <a:ext uri="{28A0092B-C50C-407E-A947-70E740481C1C}">
+                  <a14:useLocalDpi xmlns:a14="http://schemas.microsoft.com/office/drawing/2010/main" val="0"/>
+                </a:ext>
+              </a:extLst>
+            </a:blip>
+            <a:stretch>
+              <a:fillRect/>
+            </a:stretch>
+          </p:blipFill>
+          <p:spPr>
+            <a:xfrm>
+              <a:off x="1212850" y="4000320"/>
+              <a:ext cx="2538942" cy="2668479"/>
+            </a:xfrm>
+            <a:prstGeom prst="rect">
+              <a:avLst/>
+            </a:prstGeom>
+          </p:spPr>
+        </p:pic>
+        <p:sp>
+          <p:nvSpPr>
+            <p:cNvPr id="16" name="TextBox 15"/>
+            <p:cNvSpPr txBox="1"/>
+            <p:nvPr/>
+          </p:nvSpPr>
+          <p:spPr>
+            <a:xfrm>
+              <a:off x="1251239" y="4023279"/>
+              <a:ext cx="2500554" cy="497210"/>
+            </a:xfrm>
+            <a:prstGeom prst="rect">
+              <a:avLst/>
+            </a:prstGeom>
+            <a:noFill/>
+          </p:spPr>
+          <p:txBody>
+            <a:bodyPr wrap="square" rtlCol="0">
+              <a:spAutoFit/>
+            </a:bodyPr>
+            <a:lstStyle/>
+            <a:p>
+              <a:r>
+                <a:rPr lang="en-US" sz="2000" smtClean="0"/>
+                <a:t>XOR</a:t>
+              </a:r>
+              <a:endParaRPr lang="en-US" sz="2000"/>
+            </a:p>
+          </p:txBody>
+        </p:sp>
+        <p:sp>
+          <p:nvSpPr>
+            <p:cNvPr id="17" name="TextBox 16"/>
+            <p:cNvSpPr txBox="1"/>
+            <p:nvPr/>
+          </p:nvSpPr>
+          <p:spPr>
+            <a:xfrm>
+              <a:off x="3751792" y="4058494"/>
+              <a:ext cx="2500554" cy="497210"/>
+            </a:xfrm>
+            <a:prstGeom prst="rect">
+              <a:avLst/>
+            </a:prstGeom>
+            <a:noFill/>
+          </p:spPr>
+          <p:txBody>
+            <a:bodyPr wrap="square" rtlCol="0">
+              <a:spAutoFit/>
+            </a:bodyPr>
+            <a:lstStyle/>
+            <a:p>
+              <a:r>
+                <a:rPr lang="en-US" sz="2000" smtClean="0"/>
+                <a:t>Cluster</a:t>
+              </a:r>
+              <a:endParaRPr lang="en-US" sz="2000"/>
+            </a:p>
+          </p:txBody>
+        </p:sp>
+        <p:sp>
+          <p:nvSpPr>
+            <p:cNvPr id="18" name="TextBox 17"/>
+            <p:cNvSpPr txBox="1"/>
+            <p:nvPr/>
+          </p:nvSpPr>
+          <p:spPr>
+            <a:xfrm>
+              <a:off x="6290733" y="4023279"/>
+              <a:ext cx="2538942" cy="497210"/>
+            </a:xfrm>
+            <a:prstGeom prst="rect">
+              <a:avLst/>
+            </a:prstGeom>
+            <a:noFill/>
+          </p:spPr>
+          <p:txBody>
+            <a:bodyPr wrap="square" rtlCol="0">
+              <a:spAutoFit/>
+            </a:bodyPr>
+            <a:lstStyle/>
+            <a:p>
+              <a:r>
+                <a:rPr lang="en-US" sz="2000" dirty="0" smtClean="0"/>
+                <a:t>Row</a:t>
+              </a:r>
+              <a:endParaRPr lang="en-US" sz="2000" dirty="0"/>
+            </a:p>
+          </p:txBody>
+        </p:sp>
+      </p:grpSp>
     </p:spTree>
     <p:extLst>
       <p:ext uri="{BB962C8B-B14F-4D97-AF65-F5344CB8AC3E}">
@@ -15848,40 +16565,6 @@
           <a:chExt cx="0" cy="0"/>
         </a:xfrm>
       </p:grpSpPr>
-      <p:sp>
-        <p:nvSpPr>
-          <p:cNvPr id="12" name="TextBox 11"/>
-          <p:cNvSpPr txBox="1"/>
-          <p:nvPr/>
-        </p:nvSpPr>
-        <p:spPr>
-          <a:xfrm>
-            <a:off x="337017" y="483489"/>
-            <a:ext cx="5910943" cy="830997"/>
-          </a:xfrm>
-          <a:prstGeom prst="rect">
-            <a:avLst/>
-          </a:prstGeom>
-          <a:noFill/>
-        </p:spPr>
-        <p:txBody>
-          <a:bodyPr wrap="square" rtlCol="0">
-            <a:spAutoFit/>
-          </a:bodyPr>
-          <a:lstStyle/>
-          <a:p>
-            <a:pPr>
-              <a:spcAft>
-                <a:spcPts val="1200"/>
-              </a:spcAft>
-            </a:pPr>
-            <a:r>
-              <a:rPr lang="en-US" sz="2400" dirty="0" smtClean="0"/>
-              <a:t>Betas are most commonly generated in extremes of the space, distant from Alphas. </a:t>
-            </a:r>
-          </a:p>
-        </p:txBody>
-      </p:sp>
       <p:pic>
         <p:nvPicPr>
           <p:cNvPr id="3" name="Picture 2"/>
@@ -15912,6 +16595,40 @@
           </a:prstGeom>
         </p:spPr>
       </p:pic>
+      <p:sp>
+        <p:nvSpPr>
+          <p:cNvPr id="4" name="TextBox 3"/>
+          <p:cNvSpPr txBox="1"/>
+          <p:nvPr/>
+        </p:nvSpPr>
+        <p:spPr>
+          <a:xfrm>
+            <a:off x="337017" y="483489"/>
+            <a:ext cx="6489085" cy="830997"/>
+          </a:xfrm>
+          <a:prstGeom prst="rect">
+            <a:avLst/>
+          </a:prstGeom>
+          <a:noFill/>
+        </p:spPr>
+        <p:txBody>
+          <a:bodyPr wrap="square" rtlCol="0">
+            <a:spAutoFit/>
+          </a:bodyPr>
+          <a:lstStyle/>
+          <a:p>
+            <a:pPr>
+              <a:spcAft>
+                <a:spcPts val="1200"/>
+              </a:spcAft>
+            </a:pPr>
+            <a:r>
+              <a:rPr lang="en-US" sz="2400" dirty="0"/>
+              <a:t>Betas are most commonly generated in extremes of the space, distant from Alphas. </a:t>
+            </a:r>
+          </a:p>
+        </p:txBody>
+      </p:sp>
     </p:spTree>
     <p:extLst>
       <p:ext uri="{BB962C8B-B14F-4D97-AF65-F5344CB8AC3E}">
@@ -15949,51 +16666,6 @@
           <a:chExt cx="0" cy="0"/>
         </a:xfrm>
       </p:grpSpPr>
-      <p:sp>
-        <p:nvSpPr>
-          <p:cNvPr id="12" name="TextBox 11"/>
-          <p:cNvSpPr txBox="1"/>
-          <p:nvPr/>
-        </p:nvSpPr>
-        <p:spPr>
-          <a:xfrm>
-            <a:off x="337017" y="483489"/>
-            <a:ext cx="5910943" cy="1723549"/>
-          </a:xfrm>
-          <a:prstGeom prst="rect">
-            <a:avLst/>
-          </a:prstGeom>
-          <a:noFill/>
-        </p:spPr>
-        <p:txBody>
-          <a:bodyPr wrap="square" rtlCol="0">
-            <a:spAutoFit/>
-          </a:bodyPr>
-          <a:lstStyle/>
-          <a:p>
-            <a:pPr>
-              <a:spcAft>
-                <a:spcPts val="1200"/>
-              </a:spcAft>
-            </a:pPr>
-            <a:r>
-              <a:rPr lang="en-US" sz="2400" dirty="0" smtClean="0"/>
-              <a:t>Betas are most commonly generated in extremes of the space, distant from Alphas. </a:t>
-            </a:r>
-          </a:p>
-          <a:p>
-            <a:pPr>
-              <a:spcAft>
-                <a:spcPts val="1200"/>
-              </a:spcAft>
-            </a:pPr>
-            <a:r>
-              <a:rPr lang="en-US" sz="2400" dirty="0" smtClean="0"/>
-              <a:t>Most distant examples are most frequently generated.</a:t>
-            </a:r>
-          </a:p>
-        </p:txBody>
-      </p:sp>
       <p:pic>
         <p:nvPicPr>
           <p:cNvPr id="3" name="Picture 2"/>
@@ -16104,6 +16776,56 @@
           </a:p>
         </p:txBody>
       </p:sp>
+      <p:sp>
+        <p:nvSpPr>
+          <p:cNvPr id="6" name="TextBox 5"/>
+          <p:cNvSpPr txBox="1"/>
+          <p:nvPr/>
+        </p:nvSpPr>
+        <p:spPr>
+          <a:xfrm>
+            <a:off x="337017" y="483489"/>
+            <a:ext cx="6489085" cy="1723549"/>
+          </a:xfrm>
+          <a:prstGeom prst="rect">
+            <a:avLst/>
+          </a:prstGeom>
+          <a:noFill/>
+        </p:spPr>
+        <p:txBody>
+          <a:bodyPr wrap="square" rtlCol="0">
+            <a:spAutoFit/>
+          </a:bodyPr>
+          <a:lstStyle/>
+          <a:p>
+            <a:pPr>
+              <a:spcAft>
+                <a:spcPts val="1200"/>
+              </a:spcAft>
+            </a:pPr>
+            <a:r>
+              <a:rPr lang="en-US" sz="2400" dirty="0"/>
+              <a:t>Betas are most commonly generated in extremes of the space, distant from Alphas. </a:t>
+            </a:r>
+          </a:p>
+          <a:p>
+            <a:pPr>
+              <a:spcAft>
+                <a:spcPts val="1200"/>
+              </a:spcAft>
+            </a:pPr>
+            <a:r>
+              <a:rPr lang="en-US" sz="2400" dirty="0"/>
+              <a:t>Most distant examples are most frequently generated</a:t>
+            </a:r>
+            <a:r>
+              <a:rPr lang="en-US" sz="2400" dirty="0" smtClean="0"/>
+              <a:t>.</a:t>
+            </a:r>
+            <a:endParaRPr lang="en-US" sz="2400" dirty="0"/>
+          </a:p>
+        </p:txBody>
+      </p:sp>
     </p:spTree>
     <p:extLst>
       <p:ext uri="{BB962C8B-B14F-4D97-AF65-F5344CB8AC3E}">
@@ -16150,7 +16872,7 @@
         <p:spPr>
           <a:xfrm>
             <a:off x="337017" y="483489"/>
-            <a:ext cx="5910943" cy="2616101"/>
+            <a:ext cx="6489085" cy="2616101"/>
           </a:xfrm>
           <a:prstGeom prst="rect">
             <a:avLst/>
@@ -25097,27 +25819,7 @@
             </a:pPr>
             <a:r>
               <a:rPr lang="en-US" sz="2000" b="1" dirty="0" smtClean="0"/>
-              <a:t>An extension of the t</a:t>
-            </a:r>
-            <a:r>
-              <a:rPr lang="en-US" sz="2000" b="1" dirty="0" smtClean="0"/>
-              <a:t>he </a:t>
-            </a:r>
-            <a:r>
-              <a:rPr lang="en-US" sz="2000" b="1" dirty="0" smtClean="0"/>
-              <a:t>Generalized Context Model </a:t>
-            </a:r>
-            <a:r>
-              <a:rPr lang="en-US" sz="2000" b="1" dirty="0" smtClean="0"/>
-              <a:t>(</a:t>
-            </a:r>
-            <a:r>
-              <a:rPr lang="en-US" sz="2000" b="1" dirty="0" smtClean="0"/>
-              <a:t>GCM; Nosofsky, </a:t>
-            </a:r>
-            <a:r>
-              <a:rPr lang="en-US" sz="2000" b="1" dirty="0" smtClean="0"/>
-              <a:t>1984)</a:t>
+              <a:t>An extension of the the Generalized Context Model (GCM; Nosofsky, 1984)</a:t>
             </a:r>
             <a:endParaRPr lang="en-US" sz="2000" b="1" dirty="0"/>
           </a:p>
@@ -25129,15 +25831,7 @@
             </a:pPr>
             <a:r>
               <a:rPr lang="en-US" dirty="0" smtClean="0"/>
-              <a:t>Categories </a:t>
-            </a:r>
-            <a:r>
-              <a:rPr lang="en-US" dirty="0" smtClean="0"/>
-              <a:t>represented as a collection of observed members (</a:t>
-            </a:r>
-            <a:r>
-              <a:rPr lang="en-US" dirty="0" smtClean="0"/>
-              <a:t>exemplars). </a:t>
+              <a:t>Categories represented as a collection of observed members (exemplars). </a:t>
             </a:r>
           </a:p>
         </p:txBody>
@@ -25208,27 +25902,7 @@
             </a:pPr>
             <a:r>
               <a:rPr lang="en-US" sz="2000" b="1" dirty="0" smtClean="0"/>
-              <a:t>An extension of the t</a:t>
-            </a:r>
-            <a:r>
-              <a:rPr lang="en-US" sz="2000" b="1" dirty="0" smtClean="0"/>
-              <a:t>he </a:t>
-            </a:r>
-            <a:r>
-              <a:rPr lang="en-US" sz="2000" b="1" dirty="0" smtClean="0"/>
-              <a:t>Generalized Context Model </a:t>
-            </a:r>
-            <a:r>
-              <a:rPr lang="en-US" sz="2000" b="1" dirty="0" smtClean="0"/>
-              <a:t>(</a:t>
-            </a:r>
-            <a:r>
-              <a:rPr lang="en-US" sz="2000" b="1" dirty="0" smtClean="0"/>
-              <a:t>GCM; Nosofsky, </a:t>
-            </a:r>
-            <a:r>
-              <a:rPr lang="en-US" sz="2000" b="1" dirty="0" smtClean="0"/>
-              <a:t>1984)</a:t>
+              <a:t>An extension of the the Generalized Context Model (GCM; Nosofsky, 1984)</a:t>
             </a:r>
             <a:endParaRPr lang="en-US" sz="2000" b="1" dirty="0"/>
           </a:p>
@@ -25240,15 +25914,7 @@
             </a:pPr>
             <a:r>
               <a:rPr lang="en-US" dirty="0" smtClean="0"/>
-              <a:t>Categories </a:t>
-            </a:r>
-            <a:r>
-              <a:rPr lang="en-US" dirty="0" smtClean="0"/>
-              <a:t>represented as a collection of observed members (</a:t>
-            </a:r>
-            <a:r>
-              <a:rPr lang="en-US" dirty="0" smtClean="0"/>
-              <a:t>exemplars). </a:t>
+              <a:t>Categories represented as a collection of observed members (exemplars). </a:t>
             </a:r>
           </a:p>
           <a:p>
@@ -25294,7 +25960,6 @@
               <a:rPr lang="en-US" dirty="0" smtClean="0"/>
               <a:t>imilarity to members of the target category. </a:t>
             </a:r>
-            <a:endParaRPr lang="en-US" dirty="0" smtClean="0"/>
           </a:p>
         </p:txBody>
       </p:sp>
@@ -26293,7 +26958,7 @@
         <p:spPr>
           <a:xfrm>
             <a:off x="616688" y="478464"/>
-            <a:ext cx="4111382" cy="6247864"/>
+            <a:ext cx="2514599" cy="4955203"/>
           </a:xfrm>
           <a:prstGeom prst="rect">
             <a:avLst/>
@@ -26339,23 +27004,59 @@
             <a:endParaRPr lang="en-US" sz="2800" dirty="0" smtClean="0"/>
           </a:p>
           <a:p>
-            <a:endParaRPr lang="en-US" sz="2800" dirty="0"/>
-          </a:p>
-          <a:p>
-            <a:endParaRPr lang="en-US" sz="2800" dirty="0" smtClean="0"/>
-          </a:p>
-          <a:p>
-            <a:r>
-              <a:rPr lang="en-US" sz="2800" dirty="0" smtClean="0"/>
-              <a:t>Special thanks to Ken Kurtz</a:t>
-            </a:r>
-          </a:p>
-          <a:p>
             <a:pPr marL="401638" indent="-381000">
               <a:buFont typeface="Arial" charset="0"/>
               <a:buChar char="•"/>
             </a:pPr>
             <a:endParaRPr lang="en-US" sz="2400" dirty="0"/>
+          </a:p>
+        </p:txBody>
+      </p:sp>
+      <p:sp>
+        <p:nvSpPr>
+          <p:cNvPr id="11" name="Rectangle 10"/>
+          <p:cNvSpPr/>
+          <p:nvPr/>
+        </p:nvSpPr>
+        <p:spPr>
+          <a:xfrm>
+            <a:off x="3131287" y="2494400"/>
+            <a:ext cx="4572000" cy="1200329"/>
+          </a:xfrm>
+          <a:prstGeom prst="rect">
+            <a:avLst/>
+          </a:prstGeom>
+        </p:spPr>
+        <p:txBody>
+          <a:bodyPr>
+            <a:spAutoFit/>
+          </a:bodyPr>
+          <a:lstStyle/>
+          <a:p>
+            <a:r>
+              <a:rPr lang="en-US" sz="2400" b="1" dirty="0"/>
+              <a:t>Special thanks to </a:t>
+            </a:r>
+          </a:p>
+          <a:p>
+            <a:r>
+              <a:rPr lang="en-US" sz="2400" dirty="0"/>
+              <a:t>Ken Kurtz</a:t>
+            </a:r>
+          </a:p>
+          <a:p>
+            <a:r>
+              <a:rPr lang="en-US" sz="2400" dirty="0"/>
+              <a:t>Alan </a:t>
+            </a:r>
+            <a:r>
+              <a:rPr lang="en-US" sz="2400" dirty="0" err="1"/>
+              <a:t>Jern</a:t>
+            </a:r>
+            <a:r>
+              <a:rPr lang="en-US" sz="2400" dirty="0"/>
+              <a:t> &amp; Charles Kemp</a:t>
+            </a:r>
           </a:p>
         </p:txBody>
       </p:sp>
@@ -28048,7 +28749,7 @@
         </p:blipFill>
         <p:spPr>
           <a:xfrm>
-            <a:off x="-2" y="3402418"/>
+            <a:off x="8661" y="4130748"/>
             <a:ext cx="9135339" cy="2727252"/>
           </a:xfrm>
           <a:prstGeom prst="rect">
@@ -28064,8 +28765,8 @@
         </p:nvSpPr>
         <p:spPr>
           <a:xfrm>
-            <a:off x="272114" y="429291"/>
-            <a:ext cx="8591108" cy="2739211"/>
+            <a:off x="272114" y="580915"/>
+            <a:ext cx="6780877" cy="3046988"/>
           </a:xfrm>
           <a:prstGeom prst="rect">
             <a:avLst/>
@@ -28106,6 +28807,36 @@
           </a:p>
         </p:txBody>
       </p:sp>
+      <p:pic>
+        <p:nvPicPr>
+          <p:cNvPr id="5" name="Picture 4"/>
+          <p:cNvPicPr>
+            <a:picLocks noChangeAspect="1"/>
+          </p:cNvPicPr>
+          <p:nvPr/>
+        </p:nvPicPr>
+        <p:blipFill>
+          <a:blip r:embed="rId4">
+            <a:extLst>
+              <a:ext uri="{28A0092B-C50C-407E-A947-70E740481C1C}">
+                <a14:useLocalDpi xmlns:a14="http://schemas.microsoft.com/office/drawing/2010/main" val="0"/>
+              </a:ext>
+            </a:extLst>
+          </a:blip>
+          <a:stretch>
+            <a:fillRect/>
+          </a:stretch>
+        </p:blipFill>
+        <p:spPr>
+          <a:xfrm>
+            <a:off x="7052991" y="78071"/>
+            <a:ext cx="2091009" cy="4052677"/>
+          </a:xfrm>
+          <a:prstGeom prst="rect">
+            <a:avLst/>
+          </a:prstGeom>
+        </p:spPr>
+      </p:pic>
     </p:spTree>
     <p:extLst>
       <p:ext uri="{BB962C8B-B14F-4D97-AF65-F5344CB8AC3E}">

</xml_diff>

<commit_message>
final *final* touches, also added xor sampler
</commit_message>
<xml_diff>
--- a/Presentations/ccn-bbag-march-2-2017.pptx
+++ b/Presentations/ccn-bbag-march-2-2017.pptx
@@ -767,19 +767,7 @@
             </a:r>
             <a:r>
               <a:rPr lang="en-US" baseline="0" dirty="0" smtClean="0"/>
-              <a:t> which constitutes a category, and we can analyze </a:t>
-            </a:r>
-            <a:r>
-              <a:rPr lang="en-US" baseline="0" dirty="0" smtClean="0"/>
-              <a:t>the category they made by plotting the positions of each of their crystals within the space. So </a:t>
-            </a:r>
-            <a:r>
-              <a:rPr lang="en-US" baseline="0" dirty="0" smtClean="0"/>
-              <a:t>if you imagine that a participant created these for examples into their category, then you could </a:t>
-            </a:r>
-            <a:r>
-              <a:rPr lang="en-US" baseline="0" dirty="0" smtClean="0"/>
-              <a:t>plot their category next to the category that they learned to reveal a lot about their approach.</a:t>
+              <a:t> which constitutes a category, and we can analyze the category they made by plotting the positions of each of their crystals within the space. So if you imagine that a participant created these for examples into their category, then you could plot their category next to the category that they learned to reveal a lot about their approach.</a:t>
             </a:r>
           </a:p>
         </p:txBody>
@@ -874,24 +862,16 @@
             </a:r>
             <a:r>
               <a:rPr lang="en-US" baseline="0" dirty="0" smtClean="0"/>
-              <a:t> and Kemp found was pretty much what we already knew. Their manipulation was in the relationship between size and saturation, within the experimenter define categories. Some participants </a:t>
-            </a:r>
+              <a:t> and Kemp found was pretty much what we already knew. Their manipulation was in the relationship between size and saturation, within the experimenter define categories. Some participants learned this category with positive correlation, so larger crystals tend to be more saturated, and some participants learned this negative correlation category.</a:t>
+            </a:r>
+          </a:p>
+          <a:p>
+            <a:endParaRPr lang="en-US" baseline="0" dirty="0" smtClean="0"/>
+          </a:p>
+          <a:p>
             <a:r>
               <a:rPr lang="en-US" baseline="0" dirty="0" smtClean="0"/>
-              <a:t>learned this category with positive correlation, so larger crystals tend to be more saturated, and some participants learned this negative correlation category.</a:t>
-            </a:r>
-          </a:p>
-          <a:p>
-            <a:endParaRPr lang="en-US" baseline="0" dirty="0" smtClean="0"/>
-          </a:p>
-          <a:p>
-            <a:r>
-              <a:rPr lang="en-US" baseline="0" dirty="0" smtClean="0"/>
-              <a:t>And after participants learned the categories, they tended to generate new categories with the same properties. So if they learned the positive correlation category, then they tended to generate a new category with positive correlation, and vice-versa. And </a:t>
-            </a:r>
-            <a:r>
-              <a:rPr lang="en-US" baseline="0" dirty="0" smtClean="0"/>
-              <a:t>this lines up really nicely with the earlier observation that alien species obey the same correlations as found on earth.</a:t>
+              <a:t>And after participants learned the categories, they tended to generate new categories with the same properties. So if they learned the positive correlation category, then they tended to generate a new category with positive correlation, and vice-versa. And this lines up really nicely with the earlier observation that alien species obey the same correlations as found on earth.</a:t>
             </a:r>
           </a:p>
         </p:txBody>
@@ -987,11 +967,7 @@
           <a:p>
             <a:r>
               <a:rPr lang="en-US" baseline="0" dirty="0" smtClean="0"/>
-              <a:t>Basically, the model learns about how each category is distributed across the space --  in terms of how each physical attribute varies, and how they are correlated. Then, the model makes an inference using the common patterns of </a:t>
-            </a:r>
-            <a:r>
-              <a:rPr lang="en-US" baseline="0" dirty="0" smtClean="0"/>
-              <a:t>variability across the categories it knows about </a:t>
+              <a:t>Basically, the model learns about how each category is distributed across the space --  in terms of how each physical attribute varies, and how they are correlated. Then, the model makes an inference using the common patterns of variability across the categories it knows about </a:t>
             </a:r>
             <a:r>
               <a:rPr lang="mr-IN" baseline="0" dirty="0" smtClean="0"/>
@@ -1196,38 +1172,17 @@
           <a:p>
             <a:r>
               <a:rPr lang="en-US" baseline="0" dirty="0" smtClean="0"/>
-              <a:t>We developed a two dimensional domain of squares varying in color and in size. In our experiments, participants first complete a training phase where they are taught about a category that we defined as a collection of these </a:t>
-            </a:r>
+              <a:t>We developed a two dimensional domain of squares varying in color and in size. In our experiments, participants first complete a training phase where they are taught about a category that we defined as a collection of these squares. In each of our experiments, participants only learn about one experimenter-defined category, which we call the “alpha category”.</a:t>
+            </a:r>
+          </a:p>
+          <a:p>
+            <a:endParaRPr lang="en-US" baseline="0" dirty="0" smtClean="0"/>
+          </a:p>
+          <a:p>
             <a:r>
               <a:rPr lang="en-US" baseline="0" dirty="0" smtClean="0"/>
-              <a:t>squares. In each of our experiments, participants only learn about one experimenter-defined category, which we call the “alpha category”.</a:t>
-            </a:r>
-          </a:p>
-          <a:p>
-            <a:endParaRPr lang="en-US" baseline="0" dirty="0" smtClean="0"/>
-          </a:p>
-          <a:p>
-            <a:r>
-              <a:rPr lang="en-US" baseline="0" dirty="0" smtClean="0"/>
-              <a:t>Then</a:t>
-            </a:r>
-            <a:r>
-              <a:rPr lang="en-US" baseline="0" dirty="0" smtClean="0"/>
-              <a:t>, they complete a generation phase where they we ask them generate a new </a:t>
-            </a:r>
-            <a:r>
-              <a:rPr lang="en-US" baseline="0" dirty="0" smtClean="0"/>
-              <a:t>category, which we call the “</a:t>
-            </a:r>
-            <a:r>
-              <a:rPr lang="en-US" baseline="0" dirty="0" smtClean="0"/>
-              <a:t>Beta” </a:t>
-            </a:r>
-            <a:r>
-              <a:rPr lang="en-US" baseline="0" dirty="0" smtClean="0"/>
-              <a:t>category.</a:t>
-            </a:r>
-            <a:endParaRPr lang="en-US" baseline="0" dirty="0" smtClean="0"/>
+              <a:t>Then, they complete a generation phase where they we ask them generate a new category, which we call the “Beta” category.</a:t>
+            </a:r>
           </a:p>
           <a:p>
             <a:endParaRPr lang="en-US" baseline="0" dirty="0" smtClean="0"/>
@@ -1615,13 +1570,8 @@
             </a:r>
             <a:r>
               <a:rPr lang="en-US" baseline="0" dirty="0" smtClean="0"/>
-              <a:t> for illustrative reasons. Participants are only ever exposed to squares of a particular size and </a:t>
-            </a:r>
-            <a:r>
-              <a:rPr lang="en-US" baseline="0" dirty="0" smtClean="0"/>
-              <a:t>color, so any conceptual representation of the classes must be learned.</a:t>
-            </a:r>
-            <a:endParaRPr lang="en-US" baseline="0" dirty="0" smtClean="0"/>
+              <a:t> for illustrative reasons. Participants are only ever exposed to squares of a particular size and color, so any conceptual representation of the classes must be learned.</a:t>
+            </a:r>
           </a:p>
           <a:p>
             <a:endParaRPr lang="en-US" baseline="0" dirty="0" smtClean="0"/>
@@ -1985,35 +1935,11 @@
           <a:p>
             <a:r>
               <a:rPr lang="en-US" dirty="0" smtClean="0"/>
-              <a:t>So given what we know about category generation, </a:t>
-            </a:r>
-            <a:r>
-              <a:rPr lang="en-US" dirty="0" smtClean="0"/>
-              <a:t>we can make a few predictions about what we should expect to see.</a:t>
+              <a:t>So given what we know about category generation, we can make a few predictions about what we should expect to see.</a:t>
             </a:r>
             <a:r>
               <a:rPr lang="en-US" baseline="0" dirty="0" smtClean="0"/>
-              <a:t> Since </a:t>
-            </a:r>
-            <a:r>
-              <a:rPr lang="en-US" baseline="0" dirty="0" smtClean="0"/>
-              <a:t>people seem to emulate the structure of </a:t>
-            </a:r>
-            <a:r>
-              <a:rPr lang="en-US" baseline="0" dirty="0" smtClean="0"/>
-              <a:t>learned categories</a:t>
-            </a:r>
-            <a:r>
-              <a:rPr lang="en-US" baseline="0" dirty="0" smtClean="0"/>
-              <a:t>, then </a:t>
-            </a:r>
-            <a:r>
-              <a:rPr lang="en-US" baseline="0" dirty="0" smtClean="0"/>
-              <a:t>the distribution of generated categories should </a:t>
-            </a:r>
-            <a:r>
-              <a:rPr lang="en-US" baseline="0" dirty="0" smtClean="0"/>
-              <a:t>reflect whatever Alpha category was learned. </a:t>
+              <a:t> Since people seem to emulate the structure of learned categories, then the distribution of generated categories should reflect whatever Alpha category was learned. </a:t>
             </a:r>
           </a:p>
           <a:p>
@@ -2126,19 +2052,7 @@
             </a:pPr>
             <a:r>
               <a:rPr lang="en-US" dirty="0" smtClean="0"/>
-              <a:t>Ok, so </a:t>
-            </a:r>
-            <a:r>
-              <a:rPr lang="en-US" dirty="0" smtClean="0"/>
-              <a:t>just </a:t>
-            </a:r>
-            <a:r>
-              <a:rPr lang="en-US" dirty="0" smtClean="0"/>
-              <a:t>to give you a sense </a:t>
-            </a:r>
-            <a:r>
-              <a:rPr lang="en-US" dirty="0" smtClean="0"/>
-              <a:t>of the form that this data comes</a:t>
+              <a:t>Ok, so just to give you a sense of the form that this data comes</a:t>
             </a:r>
             <a:r>
               <a:rPr lang="en-US" baseline="0" dirty="0" smtClean="0"/>
@@ -2146,45 +2060,12 @@
             </a:r>
             <a:r>
               <a:rPr lang="en-US" dirty="0" smtClean="0"/>
-              <a:t> </a:t>
-            </a:r>
-            <a:r>
-              <a:rPr lang="en-US" dirty="0" smtClean="0"/>
-              <a:t>some samples on the slide.</a:t>
+              <a:t> some samples on the slide.</a:t>
             </a:r>
             <a:r>
               <a:rPr lang="en-US" baseline="0" dirty="0" smtClean="0"/>
-              <a:t> </a:t>
-            </a:r>
-            <a:r>
-              <a:rPr lang="en-US" baseline="0" dirty="0" smtClean="0"/>
-              <a:t>Each </a:t>
-            </a:r>
-            <a:r>
-              <a:rPr lang="en-US" baseline="0" dirty="0" smtClean="0"/>
-              <a:t>of these subplots came from a single participant, and I’ve just plotted </a:t>
-            </a:r>
-            <a:r>
-              <a:rPr lang="en-US" baseline="0" dirty="0" smtClean="0"/>
-              <a:t>the </a:t>
-            </a:r>
-            <a:r>
-              <a:rPr lang="en-US" baseline="0" dirty="0" smtClean="0"/>
-              <a:t>members of </a:t>
-            </a:r>
-            <a:r>
-              <a:rPr lang="en-US" baseline="0" dirty="0" smtClean="0"/>
-              <a:t>alpha category for the condition the participant was in, as well as where they generated the betas. And </a:t>
-            </a:r>
-            <a:r>
-              <a:rPr lang="en-US" baseline="0" dirty="0" smtClean="0"/>
-              <a:t>again, remember that each point in one of these plots corresponds to a physical </a:t>
-            </a:r>
-            <a:r>
-              <a:rPr lang="en-US" baseline="0" dirty="0" smtClean="0"/>
-              <a:t>stimulus.</a:t>
-            </a:r>
-            <a:endParaRPr lang="en-US" baseline="0" dirty="0" smtClean="0"/>
+              <a:t> Each of these subplots came from a single participant, and I’ve just plotted the members of alpha category for the condition the participant was in, as well as where they generated the betas. And again, remember that each point in one of these plots corresponds to a physical stimulus.</a:t>
+            </a:r>
           </a:p>
           <a:p>
             <a:pPr marL="0" marR="0" indent="0" algn="l" defTabSz="914400" rtl="0" eaLnBrk="1" fontAlgn="auto" latinLnBrk="0" hangingPunct="1">
@@ -2330,11 +2211,7 @@
             </a:pPr>
             <a:r>
               <a:rPr lang="en-US" dirty="0" smtClean="0"/>
-              <a:t>And here are the samples from the cluster </a:t>
-            </a:r>
-            <a:r>
-              <a:rPr lang="en-US" dirty="0" smtClean="0"/>
-              <a:t>condition.</a:t>
+              <a:t>And here are the samples from the cluster condition.</a:t>
             </a:r>
             <a:endParaRPr lang="en-US" baseline="0" dirty="0" smtClean="0"/>
           </a:p>
@@ -2445,7 +2322,6 @@
               <a:rPr lang="en-US" baseline="0" dirty="0" smtClean="0"/>
               <a:t>. And what I hope you can see is that there’s a huge degree of differences between people and conditions, but there’s also a lot of commonalities. </a:t>
             </a:r>
-            <a:endParaRPr lang="en-US" baseline="0" dirty="0" smtClean="0"/>
           </a:p>
           <a:p>
             <a:pPr marL="0" marR="0" indent="0" algn="l" defTabSz="914400" rtl="0" eaLnBrk="1" fontAlgn="auto" latinLnBrk="0" hangingPunct="1">
@@ -2487,11 +2363,7 @@
             </a:pPr>
             <a:r>
               <a:rPr lang="en-US" baseline="0" dirty="0" smtClean="0"/>
-              <a:t>And I know this is a lot to take in all at once, so I suppose what I just want to express is that this </a:t>
-            </a:r>
-            <a:r>
-              <a:rPr lang="en-US" baseline="0" dirty="0" smtClean="0"/>
-              <a:t>data is just super super rich.</a:t>
+              <a:t>And I know this is a lot to take in all at once, so I suppose what I just want to express is that this data is just super super rich.</a:t>
             </a:r>
           </a:p>
         </p:txBody>
@@ -3302,25 +3174,12 @@
             </a:pPr>
             <a:r>
               <a:rPr lang="en-US" dirty="0" smtClean="0"/>
-              <a:t>So </a:t>
-            </a:r>
-            <a:r>
-              <a:rPr lang="en-US" dirty="0" smtClean="0"/>
-              <a:t>I</a:t>
+              <a:t>So I</a:t>
             </a:r>
             <a:r>
               <a:rPr lang="en-US" baseline="0" dirty="0" smtClean="0"/>
-              <a:t> </a:t>
-            </a:r>
-            <a:r>
-              <a:rPr lang="en-US" baseline="0" dirty="0" smtClean="0"/>
-              <a:t>think that’s some pretty good evidence that people do emulate the distributional properties of </a:t>
-            </a:r>
-            <a:r>
-              <a:rPr lang="en-US" baseline="0" dirty="0" smtClean="0"/>
-              <a:t>the categories they know about.</a:t>
-            </a:r>
-            <a:endParaRPr lang="en-US" baseline="0" dirty="0" smtClean="0"/>
+              <a:t> think that’s some pretty good evidence that people do emulate the distributional properties of the categories they know about.</a:t>
+            </a:r>
           </a:p>
           <a:p>
             <a:pPr marL="0" marR="0" indent="0" algn="l" defTabSz="914400" rtl="0" eaLnBrk="1" fontAlgn="auto" latinLnBrk="0" hangingPunct="1">
@@ -3362,11 +3221,7 @@
             </a:pPr>
             <a:r>
               <a:rPr lang="en-US" baseline="0" dirty="0" smtClean="0"/>
-              <a:t>On </a:t>
-            </a:r>
-            <a:r>
-              <a:rPr lang="en-US" baseline="0" dirty="0" smtClean="0"/>
-              <a:t>the slide now I’m showing you </a:t>
+              <a:t>On the slide now I’m showing you </a:t>
             </a:r>
             <a:r>
               <a:rPr lang="en-US" baseline="0" dirty="0" err="1" smtClean="0"/>
@@ -3374,19 +3229,7 @@
             </a:r>
             <a:r>
               <a:rPr lang="en-US" baseline="0" dirty="0" smtClean="0"/>
-              <a:t> of where people tended to generate beta category examples. Each figure is for one condition, and </a:t>
-            </a:r>
-            <a:r>
-              <a:rPr lang="en-US" baseline="0" dirty="0" smtClean="0"/>
-              <a:t>blue areas correspond </a:t>
-            </a:r>
-            <a:r>
-              <a:rPr lang="en-US" baseline="0" dirty="0" smtClean="0"/>
-              <a:t>to </a:t>
-            </a:r>
-            <a:r>
-              <a:rPr lang="en-US" baseline="0" dirty="0" smtClean="0"/>
-              <a:t>stimuli that were frequently generated. </a:t>
+              <a:t> of where people tended to generate beta category examples. Each figure is for one condition, and blue areas correspond to stimuli that were frequently generated. </a:t>
             </a:r>
           </a:p>
           <a:p>
@@ -3429,13 +3272,8 @@
             </a:pPr>
             <a:r>
               <a:rPr lang="en-US" baseline="0" dirty="0" smtClean="0"/>
-              <a:t>And you can see that people really prefer to put the betas along the edges and corners of the space. I think this reflects a goal </a:t>
-            </a:r>
-            <a:r>
-              <a:rPr lang="en-US" baseline="0" dirty="0" smtClean="0"/>
-              <a:t>that the beta category members should be perceptually dissimilar, or distant in space, from the alphas. Right, so the three corners opposite the alphas are most popular in cluster, the top row opposite the alphas is most popular I row, and the two corners opposite the alphas are most popular in XOR.</a:t>
-            </a:r>
-            <a:endParaRPr lang="en-US" baseline="0" dirty="0" smtClean="0"/>
+              <a:t>And you can see that people really prefer to put the betas along the edges and corners of the space. I think this reflects a goal that the beta category members should be perceptually dissimilar, or distant in space, from the alphas. Right, so the three corners opposite the alphas are most popular in cluster, the top row opposite the alphas is most popular I row, and the two corners opposite the alphas are most popular in XOR.</a:t>
+            </a:r>
           </a:p>
         </p:txBody>
       </p:sp>
@@ -7048,11 +6886,7 @@
           <a:p>
             <a:r>
               <a:rPr lang="en-US" baseline="0" dirty="0" smtClean="0"/>
-              <a:t>The typical finding is that prior knowledge is hugely constraining on creative generation. On the slide I have some example alien species from a study conduced by Thomas Ward, and you can see that alien species </a:t>
-            </a:r>
-            <a:r>
-              <a:rPr lang="en-US" baseline="0" dirty="0" smtClean="0"/>
-              <a:t>have the features of earth species, right, they have arms and legs and ears and so on.</a:t>
+              <a:t>The typical finding is that prior knowledge is hugely constraining on creative generation. On the slide I have some example alien species from a study conduced by Thomas Ward, and you can see that alien species have the features of earth species, right, they have arms and legs and ears and so on.</a:t>
             </a:r>
           </a:p>
           <a:p>
@@ -7063,7 +6897,6 @@
               <a:rPr lang="en-US" baseline="0" dirty="0" smtClean="0"/>
               <a:t>But even more interestingly is that they tend to have the same distributional properties as earth species. For example, the same feature correlations are followed, so the presence of ears predicts the presence of a nose. And also members of the same species tend to be more similar to one another than they are to members of opposite species.</a:t>
             </a:r>
-            <a:endParaRPr lang="en-US" baseline="0" dirty="0" smtClean="0"/>
           </a:p>
           <a:p>
             <a:endParaRPr lang="en-US" baseline="0" dirty="0" smtClean="0"/>
@@ -7435,7 +7268,6 @@
               <a:rPr lang="en-US" baseline="0" dirty="0" smtClean="0"/>
               <a:t> is typically the case when you want to develop a formal model of complex behavior, the approach taken to model category generation has been to simplify the domain. </a:t>
             </a:r>
-            <a:endParaRPr lang="en-US" baseline="0" dirty="0" smtClean="0"/>
           </a:p>
           <a:p>
             <a:endParaRPr lang="en-US" baseline="0" dirty="0" smtClean="0"/>
@@ -7451,15 +7283,7 @@
             </a:r>
             <a:r>
               <a:rPr lang="en-US" baseline="0" dirty="0" smtClean="0"/>
-              <a:t> &amp; Charles Kemp were the first to report anything like this. They developed a artificial, three-dimensional domain of what they called “crystals”, varying in size, hue, and </a:t>
-            </a:r>
-            <a:r>
-              <a:rPr lang="en-US" baseline="0" dirty="0" smtClean="0"/>
-              <a:t>saturation, so you can visualize the domain as a cube. </a:t>
-            </a:r>
-            <a:r>
-              <a:rPr lang="en-US" baseline="0" dirty="0" smtClean="0"/>
-              <a:t>Each on these items at the bottom of the slide is one crystal, which can be conceptualized as a point in the three dimensional domain space.</a:t>
+              <a:t> &amp; Charles Kemp were the first to report anything like this. They developed a artificial, three-dimensional domain of what they called “crystals”, varying in size, hue, and saturation, so you can visualize the domain as a cube. Each on these items at the bottom of the slide is one crystal, which can be conceptualized as a point in the three dimensional domain space.</a:t>
             </a:r>
           </a:p>
           <a:p>
@@ -18666,11 +18490,7 @@
             </a:pPr>
             <a:r>
               <a:rPr lang="en-US" sz="2200" dirty="0" smtClean="0"/>
-              <a:t>Conditions visualized as points in 2D </a:t>
-            </a:r>
-            <a:r>
-              <a:rPr lang="en-US" sz="2200" dirty="0" smtClean="0"/>
-              <a:t>Space</a:t>
+              <a:t>Conditions visualized as points in 2D Space</a:t>
             </a:r>
             <a:r>
               <a:rPr lang="en-US" sz="2200" b="1" dirty="0" smtClean="0"/>
@@ -18678,11 +18498,7 @@
             </a:r>
             <a:r>
               <a:rPr lang="en-US" sz="2200" dirty="0" smtClean="0"/>
-              <a:t> </a:t>
-            </a:r>
-            <a:r>
-              <a:rPr lang="en-US" sz="2200" dirty="0" smtClean="0"/>
-              <a:t>(they only see the physical stimuli)</a:t>
+              <a:t> (they only see the physical stimuli)</a:t>
             </a:r>
           </a:p>
           <a:p>
@@ -35243,8 +35059,8 @@
             </p:sp>
           </mc:Fallback>
         </mc:AlternateContent>
-        <mc:AlternateContent xmlns:mc="http://schemas.openxmlformats.org/markup-compatibility/2006" xmlns:a14="http://schemas.microsoft.com/office/drawing/2010/main">
-          <mc:Choice Requires="a14">
+        <mc:AlternateContent xmlns:mc="http://schemas.openxmlformats.org/markup-compatibility/2006">
+          <mc:Choice xmlns:a14="http://schemas.microsoft.com/office/drawing/2010/main" Requires="a14">
             <p:sp>
               <p:nvSpPr>
                 <p:cNvPr id="16" name="TextBox 15"/>
@@ -35448,7 +35264,7 @@
                                       <a:rPr lang="en-US" sz="1600" b="0" i="1" smtClean="0">
                                         <a:latin typeface="Cambria Math" charset="0"/>
                                       </a:rPr>
-                                      <m:t>   </m:t>
+                                      <m:t>    </m:t>
                                     </m:r>
                                     <m:r>
                                       <a:rPr lang="en-US" sz="1600" i="1">
@@ -35538,7 +35354,7 @@
               </p:txBody>
             </p:sp>
           </mc:Choice>
-          <mc:Fallback xmlns="">
+          <mc:Fallback>
             <p:sp>
               <p:nvSpPr>
                 <p:cNvPr id="16" name="TextBox 15"/>
@@ -36513,8 +36329,8 @@
         </p:nvSpPr>
         <p:spPr>
           <a:xfrm>
-            <a:off x="435934" y="388841"/>
-            <a:ext cx="8346560" cy="3108543"/>
+            <a:off x="435934" y="208088"/>
+            <a:ext cx="8346560" cy="3416320"/>
           </a:xfrm>
           <a:prstGeom prst="rect">
             <a:avLst/>
@@ -36585,7 +36401,11 @@
             </a:pPr>
             <a:r>
               <a:rPr lang="en-US" sz="2000" dirty="0" smtClean="0"/>
-              <a:t>There is a lot going into category generation, </a:t>
+              <a:t>There is a lot going into category </a:t>
+            </a:r>
+            <a:r>
+              <a:rPr lang="en-US" sz="2000" dirty="0" smtClean="0"/>
+              <a:t>generation </a:t>
             </a:r>
             <a:r>
               <a:rPr lang="en-US" sz="2000" i="1" dirty="0" smtClean="0"/>
@@ -36593,8 +36413,13 @@
             </a:r>
             <a:r>
               <a:rPr lang="en-US" sz="2000" dirty="0" smtClean="0"/>
-              <a:t> prior knowledge.</a:t>
-            </a:r>
+              <a:t> prior </a:t>
+            </a:r>
+            <a:r>
+              <a:rPr lang="en-US" sz="2000" dirty="0" smtClean="0"/>
+              <a:t>knowledge of distributional structure.</a:t>
+            </a:r>
+            <a:endParaRPr lang="en-US" sz="2000" dirty="0" smtClean="0"/>
           </a:p>
           <a:p>
             <a:pPr marL="285750" indent="-285750">

</xml_diff>

<commit_message>
update readme; slight edits to slides prior to yesterdays talk
</commit_message>
<xml_diff>
--- a/Presentations/ccn-bbag-march-2-2017.pptx
+++ b/Presentations/ccn-bbag-march-2-2017.pptx
@@ -18489,12 +18489,12 @@
               <a:buChar char="•"/>
             </a:pPr>
             <a:r>
-              <a:rPr lang="en-US" sz="2200" dirty="0" smtClean="0"/>
-              <a:t>Conditions visualized as points in 2D Space</a:t>
+              <a:rPr lang="en-US" sz="2200" b="1" dirty="0"/>
+              <a:t>P</a:t>
             </a:r>
             <a:r>
               <a:rPr lang="en-US" sz="2200" b="1" dirty="0" smtClean="0"/>
-              <a:t>, participants never see this representation</a:t>
+              <a:t>articipants never see conceptual representation</a:t>
             </a:r>
             <a:r>
               <a:rPr lang="en-US" sz="2200" dirty="0" smtClean="0"/>
@@ -18819,8 +18819,8 @@
               <a:buChar char="•"/>
             </a:pPr>
             <a:r>
-              <a:rPr lang="en-US" sz="2200" dirty="0" smtClean="0"/>
-              <a:t>Conditions visualized as points in 2D Space, participants never see this representation (they only see the physical stimuli)</a:t>
+              <a:rPr lang="en-US" sz="2200" dirty="0"/>
+              <a:t>Participants never see conceptual representation (they only see the physical stimuli)</a:t>
             </a:r>
           </a:p>
           <a:p>
@@ -35059,8 +35059,8 @@
             </p:sp>
           </mc:Fallback>
         </mc:AlternateContent>
-        <mc:AlternateContent xmlns:mc="http://schemas.openxmlformats.org/markup-compatibility/2006">
-          <mc:Choice xmlns:a14="http://schemas.microsoft.com/office/drawing/2010/main" Requires="a14">
+        <mc:AlternateContent xmlns:mc="http://schemas.openxmlformats.org/markup-compatibility/2006" xmlns:a14="http://schemas.microsoft.com/office/drawing/2010/main">
+          <mc:Choice Requires="a14">
             <p:sp>
               <p:nvSpPr>
                 <p:cNvPr id="16" name="TextBox 15"/>
@@ -35354,7 +35354,7 @@
               </p:txBody>
             </p:sp>
           </mc:Choice>
-          <mc:Fallback>
+          <mc:Fallback xmlns="">
             <p:sp>
               <p:nvSpPr>
                 <p:cNvPr id="16" name="TextBox 15"/>
@@ -36401,11 +36401,7 @@
             </a:pPr>
             <a:r>
               <a:rPr lang="en-US" sz="2000" dirty="0" smtClean="0"/>
-              <a:t>There is a lot going into category </a:t>
-            </a:r>
-            <a:r>
-              <a:rPr lang="en-US" sz="2000" dirty="0" smtClean="0"/>
-              <a:t>generation </a:t>
+              <a:t>There is a lot going into category generation </a:t>
             </a:r>
             <a:r>
               <a:rPr lang="en-US" sz="2000" i="1" dirty="0" smtClean="0"/>
@@ -36413,13 +36409,8 @@
             </a:r>
             <a:r>
               <a:rPr lang="en-US" sz="2000" dirty="0" smtClean="0"/>
-              <a:t> prior </a:t>
-            </a:r>
-            <a:r>
-              <a:rPr lang="en-US" sz="2000" dirty="0" smtClean="0"/>
-              <a:t>knowledge of distributional structure.</a:t>
-            </a:r>
-            <a:endParaRPr lang="en-US" sz="2000" dirty="0" smtClean="0"/>
+              <a:t> prior knowledge of distributional structure.</a:t>
+            </a:r>
           </a:p>
           <a:p>
             <a:pPr marL="285750" indent="-285750">

</xml_diff>